<commit_message>
0709: modify description errors
</commit_message>
<xml_diff>
--- a/assets/img/notice/template.pptx
+++ b/assets/img/notice/template.pptx
@@ -3754,17 +3754,17 @@
                 <a:buChar char="•"/>
               </a:pPr>
               <a:r>
-                <a:rPr lang="en-US" altLang="ko-KR" b="1" dirty="0">
+                <a:rPr lang="en-US" altLang="ko-KR" b="1">
                   <a:solidFill>
                     <a:srgbClr val="A52A2A"/>
                   </a:solidFill>
                   <a:latin typeface="제주고딕" panose="02000300000000000000" pitchFamily="2" charset="-127"/>
                   <a:ea typeface="제주고딕" panose="02000300000000000000" pitchFamily="2" charset="-127"/>
                 </a:rPr>
-                <a:t>ACL 2024</a:t>
+                <a:t>ACL 2025</a:t>
               </a:r>
               <a:r>
-                <a:rPr lang="ko-KR" altLang="en-US" dirty="0">
+                <a:rPr lang="ko-KR" altLang="en-US">
                   <a:latin typeface="제주고딕" panose="02000300000000000000" pitchFamily="2" charset="-127"/>
                   <a:ea typeface="제주고딕" panose="02000300000000000000" pitchFamily="2" charset="-127"/>
                 </a:rPr>
@@ -3814,7 +3814,7 @@
                   <a:latin typeface="제주고딕" panose="02000300000000000000" pitchFamily="2" charset="-127"/>
                   <a:ea typeface="제주고딕" panose="02000300000000000000" pitchFamily="2" charset="-127"/>
                 </a:rPr>
-                <a:t>(BK Plus Computer Science IF=3)</a:t>
+                <a:t>(BK Plus Computer Science IF=4)</a:t>
               </a:r>
               <a:r>
                 <a:rPr lang="en-US" altLang="ko-KR" dirty="0">

</xml_diff>